<commit_message>
Dodanie nowej wersji prezentacji
</commit_message>
<xml_diff>
--- a/BAIiM - Podejrzane pliki kontra serwis do przesyłania danych.pptx
+++ b/BAIiM - Podejrzane pliki kontra serwis do przesyłania danych.pptx
@@ -5,7 +5,7 @@
     <p:sldMasterId id="2147483811" r:id="rId1"/>
   </p:sldMasterIdLst>
   <p:notesMasterIdLst>
-    <p:notesMasterId r:id="rId18"/>
+    <p:notesMasterId r:id="rId19"/>
   </p:notesMasterIdLst>
   <p:sldIdLst>
     <p:sldId id="256" r:id="rId2"/>
@@ -18,12 +18,13 @@
     <p:sldId id="269" r:id="rId9"/>
     <p:sldId id="271" r:id="rId10"/>
     <p:sldId id="270" r:id="rId11"/>
-    <p:sldId id="267" r:id="rId12"/>
-    <p:sldId id="268" r:id="rId13"/>
-    <p:sldId id="261" r:id="rId14"/>
-    <p:sldId id="262" r:id="rId15"/>
-    <p:sldId id="263" r:id="rId16"/>
-    <p:sldId id="260" r:id="rId17"/>
+    <p:sldId id="272" r:id="rId12"/>
+    <p:sldId id="267" r:id="rId13"/>
+    <p:sldId id="268" r:id="rId14"/>
+    <p:sldId id="261" r:id="rId15"/>
+    <p:sldId id="262" r:id="rId16"/>
+    <p:sldId id="263" r:id="rId17"/>
+    <p:sldId id="260" r:id="rId18"/>
   </p:sldIdLst>
   <p:sldSz cx="12192000" cy="6858000"/>
   <p:notesSz cx="6858000" cy="9144000"/>
@@ -4145,7 +4146,7 @@
           <a:p>
             <a:fld id="{FC6F3ED5-C070-45E0-B247-5726A038816D}" type="datetimeFigureOut">
               <a:rPr lang="en-GB" smtClean="0"/>
-              <a:t>01/12/2025</a:t>
+              <a:t>02/12/2025</a:t>
             </a:fld>
             <a:endParaRPr lang="en-GB"/>
           </a:p>
@@ -4653,7 +4654,7 @@
           <a:p>
             <a:fld id="{02AC24A9-CCB6-4F8D-B8DB-C2F3692CFA5A}" type="datetimeFigureOut">
               <a:rPr lang="en-US" smtClean="0"/>
-              <a:t>12/1/2025</a:t>
+              <a:t>12/2/2025</a:t>
             </a:fld>
             <a:endParaRPr lang="en-US" dirty="0"/>
           </a:p>
@@ -5023,7 +5024,7 @@
           <a:p>
             <a:fld id="{02AC24A9-CCB6-4F8D-B8DB-C2F3692CFA5A}" type="datetimeFigureOut">
               <a:rPr lang="en-US" smtClean="0"/>
-              <a:t>12/1/2025</a:t>
+              <a:t>12/2/2025</a:t>
             </a:fld>
             <a:endParaRPr lang="en-US"/>
           </a:p>
@@ -5232,7 +5233,7 @@
           <a:p>
             <a:fld id="{02AC24A9-CCB6-4F8D-B8DB-C2F3692CFA5A}" type="datetimeFigureOut">
               <a:rPr lang="en-US" smtClean="0"/>
-              <a:t>12/1/2025</a:t>
+              <a:t>12/2/2025</a:t>
             </a:fld>
             <a:endParaRPr lang="en-US"/>
           </a:p>
@@ -5702,7 +5703,7 @@
           <a:p>
             <a:fld id="{02AC24A9-CCB6-4F8D-B8DB-C2F3692CFA5A}" type="datetimeFigureOut">
               <a:rPr lang="en-US" smtClean="0"/>
-              <a:t>12/1/2025</a:t>
+              <a:t>12/2/2025</a:t>
             </a:fld>
             <a:endParaRPr lang="en-US"/>
           </a:p>
@@ -6156,7 +6157,7 @@
           <a:p>
             <a:fld id="{02AC24A9-CCB6-4F8D-B8DB-C2F3692CFA5A}" type="datetimeFigureOut">
               <a:rPr lang="en-US" smtClean="0"/>
-              <a:t>12/1/2025</a:t>
+              <a:t>12/2/2025</a:t>
             </a:fld>
             <a:endParaRPr lang="en-US"/>
           </a:p>
@@ -6688,7 +6689,7 @@
           <a:p>
             <a:fld id="{02AC24A9-CCB6-4F8D-B8DB-C2F3692CFA5A}" type="datetimeFigureOut">
               <a:rPr lang="en-US" smtClean="0"/>
-              <a:t>12/1/2025</a:t>
+              <a:t>12/2/2025</a:t>
             </a:fld>
             <a:endParaRPr lang="en-US"/>
           </a:p>
@@ -7387,7 +7388,7 @@
           <a:p>
             <a:fld id="{02AC24A9-CCB6-4F8D-B8DB-C2F3692CFA5A}" type="datetimeFigureOut">
               <a:rPr lang="en-US" smtClean="0"/>
-              <a:t>12/1/2025</a:t>
+              <a:t>12/2/2025</a:t>
             </a:fld>
             <a:endParaRPr lang="en-US"/>
           </a:p>
@@ -7716,7 +7717,7 @@
           <a:p>
             <a:fld id="{02AC24A9-CCB6-4F8D-B8DB-C2F3692CFA5A}" type="datetimeFigureOut">
               <a:rPr lang="en-US" smtClean="0"/>
-              <a:t>12/1/2025</a:t>
+              <a:t>12/2/2025</a:t>
             </a:fld>
             <a:endParaRPr lang="en-US"/>
           </a:p>
@@ -7829,7 +7830,7 @@
           <a:p>
             <a:fld id="{02AC24A9-CCB6-4F8D-B8DB-C2F3692CFA5A}" type="datetimeFigureOut">
               <a:rPr lang="en-US" smtClean="0"/>
-              <a:t>12/1/2025</a:t>
+              <a:t>12/2/2025</a:t>
             </a:fld>
             <a:endParaRPr lang="en-US"/>
           </a:p>
@@ -8324,7 +8325,7 @@
           <a:p>
             <a:fld id="{02AC24A9-CCB6-4F8D-B8DB-C2F3692CFA5A}" type="datetimeFigureOut">
               <a:rPr lang="en-US" smtClean="0"/>
-              <a:t>12/1/2025</a:t>
+              <a:t>12/2/2025</a:t>
             </a:fld>
             <a:endParaRPr lang="en-US" dirty="0"/>
           </a:p>
@@ -8801,7 +8802,7 @@
           <a:p>
             <a:fld id="{02AC24A9-CCB6-4F8D-B8DB-C2F3692CFA5A}" type="datetimeFigureOut">
               <a:rPr lang="en-US" smtClean="0"/>
-              <a:t>12/1/2025</a:t>
+              <a:t>12/2/2025</a:t>
             </a:fld>
             <a:endParaRPr lang="en-US"/>
           </a:p>
@@ -9044,7 +9045,7 @@
           <a:p>
             <a:fld id="{02AC24A9-CCB6-4F8D-B8DB-C2F3692CFA5A}" type="datetimeFigureOut">
               <a:rPr lang="en-US" smtClean="0"/>
-              <a:t>12/1/2025</a:t>
+              <a:t>12/2/2025</a:t>
             </a:fld>
             <a:endParaRPr lang="en-US"/>
           </a:p>
@@ -10094,6 +10095,205 @@
           <p:cNvPr id="2" name="Tytuł 1">
             <a:extLst>
               <a:ext uri="{FF2B5EF4-FFF2-40B4-BE49-F238E27FC236}">
+                <a16:creationId xmlns:a16="http://schemas.microsoft.com/office/drawing/2014/main" id="{A9CF8B34-E14D-6D28-7D56-76B8A8611141}"/>
+              </a:ext>
+            </a:extLst>
+          </p:cNvPr>
+          <p:cNvSpPr>
+            <a:spLocks noGrp="1"/>
+          </p:cNvSpPr>
+          <p:nvPr>
+            <p:ph type="title"/>
+          </p:nvPr>
+        </p:nvSpPr>
+        <p:spPr/>
+        <p:txBody>
+          <a:bodyPr/>
+          <a:lstStyle/>
+          <a:p>
+            <a:r>
+              <a:rPr lang="pl-PL" dirty="0"/>
+              <a:t>Jak bronić się przed </a:t>
+            </a:r>
+            <a:r>
+              <a:rPr lang="pl-PL" dirty="0" err="1"/>
+              <a:t>phishingiem</a:t>
+            </a:r>
+            <a:endParaRPr lang="en-GB" dirty="0"/>
+          </a:p>
+        </p:txBody>
+      </p:sp>
+      <p:sp>
+        <p:nvSpPr>
+          <p:cNvPr id="3" name="Symbol zastępczy zawartości 2">
+            <a:extLst>
+              <a:ext uri="{FF2B5EF4-FFF2-40B4-BE49-F238E27FC236}">
+                <a16:creationId xmlns:a16="http://schemas.microsoft.com/office/drawing/2014/main" id="{CC1C8EFA-2B20-FD27-4B44-3A974212DF5B}"/>
+              </a:ext>
+            </a:extLst>
+          </p:cNvPr>
+          <p:cNvSpPr>
+            <a:spLocks noGrp="1"/>
+          </p:cNvSpPr>
+          <p:nvPr>
+            <p:ph idx="1"/>
+          </p:nvPr>
+        </p:nvSpPr>
+        <p:spPr/>
+        <p:txBody>
+          <a:bodyPr>
+            <a:normAutofit fontScale="62500" lnSpcReduction="20000"/>
+          </a:bodyPr>
+          <a:lstStyle/>
+          <a:p>
+            <a:pPr marL="0" indent="0">
+              <a:buNone/>
+            </a:pPr>
+            <a:r>
+              <a:rPr lang="pl-PL" b="1" dirty="0"/>
+              <a:t>Jak bronić się przed </a:t>
+            </a:r>
+            <a:r>
+              <a:rPr lang="pl-PL" b="1" dirty="0" err="1"/>
+              <a:t>phishingiem</a:t>
+            </a:r>
+            <a:r>
+              <a:rPr lang="pl-PL" b="1" dirty="0"/>
+              <a:t>?</a:t>
+            </a:r>
+          </a:p>
+          <a:p>
+            <a:r>
+              <a:rPr lang="pl-PL" b="1" dirty="0"/>
+              <a:t>Sprawdzaj nadawcę</a:t>
+            </a:r>
+            <a:r>
+              <a:rPr lang="pl-PL" dirty="0"/>
+              <a:t> – uważaj na literówki i podejrzane domeny.</a:t>
+            </a:r>
+          </a:p>
+          <a:p>
+            <a:r>
+              <a:rPr lang="pl-PL" b="1" dirty="0"/>
+              <a:t>Nie klikaj w podejrzane linki</a:t>
+            </a:r>
+            <a:r>
+              <a:rPr lang="pl-PL" dirty="0"/>
+              <a:t> – najedź kursorem, aby zobaczyć prawdziwy adres.</a:t>
+            </a:r>
+          </a:p>
+          <a:p>
+            <a:r>
+              <a:rPr lang="pl-PL" b="1" dirty="0"/>
+              <a:t>Nie podawaj danych</a:t>
+            </a:r>
+            <a:r>
+              <a:rPr lang="pl-PL" dirty="0"/>
+              <a:t> przez e-mail/SMS, jeśli nie masz 100% pewności co do źródła.</a:t>
+            </a:r>
+          </a:p>
+          <a:p>
+            <a:r>
+              <a:rPr lang="pl-PL" b="1" dirty="0"/>
+              <a:t>Używaj MFA (dwuskładnikowe logowanie)</a:t>
+            </a:r>
+            <a:r>
+              <a:rPr lang="pl-PL" dirty="0"/>
+              <a:t> – zabezpiecza nawet przy wycieku hasła.</a:t>
+            </a:r>
+          </a:p>
+          <a:p>
+            <a:r>
+              <a:rPr lang="pl-PL" b="1" dirty="0"/>
+              <a:t>Aktualizuj oprogramowanie</a:t>
+            </a:r>
+            <a:r>
+              <a:rPr lang="pl-PL" dirty="0"/>
+              <a:t> – łata podatności wykorzystywane przez ataki.</a:t>
+            </a:r>
+          </a:p>
+          <a:p>
+            <a:r>
+              <a:rPr lang="pl-PL" b="1" dirty="0"/>
+              <a:t>Korzystaj z filtrów </a:t>
+            </a:r>
+            <a:r>
+              <a:rPr lang="pl-PL" b="1" dirty="0" err="1"/>
+              <a:t>antyphishingowych</a:t>
+            </a:r>
+            <a:r>
+              <a:rPr lang="pl-PL" dirty="0"/>
+              <a:t> w przeglądarce i poczcie.</a:t>
+            </a:r>
+          </a:p>
+          <a:p>
+            <a:r>
+              <a:rPr lang="pl-PL" b="1" dirty="0"/>
+              <a:t>Bądź czujny na presję czasu</a:t>
+            </a:r>
+            <a:r>
+              <a:rPr lang="pl-PL" dirty="0"/>
+              <a:t> – pośpiech to typowa taktyka oszustów.</a:t>
+            </a:r>
+          </a:p>
+          <a:p>
+            <a:r>
+              <a:rPr lang="pl-PL" b="1" dirty="0"/>
+              <a:t>Jeśli używasz Windowsa </a:t>
+            </a:r>
+            <a:r>
+              <a:rPr lang="pl-PL" dirty="0"/>
+              <a:t>– włącz </a:t>
+            </a:r>
+            <a:r>
+              <a:rPr lang="pl-PL" dirty="0" err="1"/>
+              <a:t>firewalla</a:t>
+            </a:r>
+            <a:r>
+              <a:rPr lang="pl-PL" dirty="0"/>
+              <a:t>. </a:t>
+            </a:r>
+          </a:p>
+          <a:p>
+            <a:endParaRPr lang="en-GB" dirty="0"/>
+          </a:p>
+        </p:txBody>
+      </p:sp>
+    </p:spTree>
+    <p:extLst>
+      <p:ext uri="{BB962C8B-B14F-4D97-AF65-F5344CB8AC3E}">
+        <p14:creationId xmlns:p14="http://schemas.microsoft.com/office/powerpoint/2010/main" val="452937081"/>
+      </p:ext>
+    </p:extLst>
+  </p:cSld>
+  <p:clrMapOvr>
+    <a:masterClrMapping/>
+  </p:clrMapOvr>
+</p:sld>
+</file>
+
+<file path=ppt/slides/slide12.xml><?xml version="1.0" encoding="utf-8"?>
+<p:sld xmlns:a="http://schemas.openxmlformats.org/drawingml/2006/main" xmlns:r="http://schemas.openxmlformats.org/officeDocument/2006/relationships" xmlns:p="http://schemas.openxmlformats.org/presentationml/2006/main">
+  <p:cSld>
+    <p:spTree>
+      <p:nvGrpSpPr>
+        <p:cNvPr id="1" name=""/>
+        <p:cNvGrpSpPr/>
+        <p:nvPr/>
+      </p:nvGrpSpPr>
+      <p:grpSpPr>
+        <a:xfrm>
+          <a:off x="0" y="0"/>
+          <a:ext cx="0" cy="0"/>
+          <a:chOff x="0" y="0"/>
+          <a:chExt cx="0" cy="0"/>
+        </a:xfrm>
+      </p:grpSpPr>
+      <p:sp>
+        <p:nvSpPr>
+          <p:cNvPr id="2" name="Tytuł 1">
+            <a:extLst>
+              <a:ext uri="{FF2B5EF4-FFF2-40B4-BE49-F238E27FC236}">
                 <a16:creationId xmlns:a16="http://schemas.microsoft.com/office/drawing/2014/main" id="{52EEC39C-A79E-91D5-939D-9D96A2BB39A3}"/>
               </a:ext>
             </a:extLst>
@@ -10163,101 +10363,6 @@
 </p:sld>
 </file>
 
-<file path=ppt/slides/slide12.xml><?xml version="1.0" encoding="utf-8"?>
-<p:sld xmlns:a="http://schemas.openxmlformats.org/drawingml/2006/main" xmlns:r="http://schemas.openxmlformats.org/officeDocument/2006/relationships" xmlns:p="http://schemas.openxmlformats.org/presentationml/2006/main">
-  <p:cSld>
-    <p:spTree>
-      <p:nvGrpSpPr>
-        <p:cNvPr id="1" name=""/>
-        <p:cNvGrpSpPr/>
-        <p:nvPr/>
-      </p:nvGrpSpPr>
-      <p:grpSpPr>
-        <a:xfrm>
-          <a:off x="0" y="0"/>
-          <a:ext cx="0" cy="0"/>
-          <a:chOff x="0" y="0"/>
-          <a:chExt cx="0" cy="0"/>
-        </a:xfrm>
-      </p:grpSpPr>
-      <p:sp>
-        <p:nvSpPr>
-          <p:cNvPr id="2" name="Tytuł 1">
-            <a:extLst>
-              <a:ext uri="{FF2B5EF4-FFF2-40B4-BE49-F238E27FC236}">
-                <a16:creationId xmlns:a16="http://schemas.microsoft.com/office/drawing/2014/main" id="{9752CA37-AB61-08D7-A919-2225D161B169}"/>
-              </a:ext>
-            </a:extLst>
-          </p:cNvPr>
-          <p:cNvSpPr>
-            <a:spLocks noGrp="1"/>
-          </p:cNvSpPr>
-          <p:nvPr>
-            <p:ph type="title"/>
-          </p:nvPr>
-        </p:nvSpPr>
-        <p:spPr/>
-        <p:txBody>
-          <a:bodyPr/>
-          <a:lstStyle/>
-          <a:p>
-            <a:r>
-              <a:rPr lang="pl-PL" dirty="0" err="1"/>
-              <a:t>VirusTotal</a:t>
-            </a:r>
-            <a:endParaRPr lang="en-GB" dirty="0"/>
-          </a:p>
-        </p:txBody>
-      </p:sp>
-      <p:sp>
-        <p:nvSpPr>
-          <p:cNvPr id="3" name="Symbol zastępczy zawartości 2">
-            <a:extLst>
-              <a:ext uri="{FF2B5EF4-FFF2-40B4-BE49-F238E27FC236}">
-                <a16:creationId xmlns:a16="http://schemas.microsoft.com/office/drawing/2014/main" id="{53F177E5-3671-CAD7-E81D-4F61503D079F}"/>
-              </a:ext>
-            </a:extLst>
-          </p:cNvPr>
-          <p:cNvSpPr>
-            <a:spLocks noGrp="1"/>
-          </p:cNvSpPr>
-          <p:nvPr>
-            <p:ph idx="1"/>
-          </p:nvPr>
-        </p:nvSpPr>
-        <p:spPr/>
-        <p:txBody>
-          <a:bodyPr/>
-          <a:lstStyle/>
-          <a:p>
-            <a:pPr marL="0" indent="0">
-              <a:buNone/>
-            </a:pPr>
-            <a:r>
-              <a:rPr lang="pl-PL" dirty="0" err="1"/>
-              <a:t>VirusTotal</a:t>
-            </a:r>
-            <a:r>
-              <a:rPr lang="pl-PL" dirty="0"/>
-              <a:t> jest to strona służąca do analizy podejrzanych plików, domen, IP oraz URL do wykrywania złośliwego oprogramowania. Używamy API, aby sprawdzać przesyłane pliki czy nie zawierają one złośliwego oprogramowania.</a:t>
-            </a:r>
-            <a:endParaRPr lang="en-GB" dirty="0"/>
-          </a:p>
-        </p:txBody>
-      </p:sp>
-    </p:spTree>
-    <p:extLst>
-      <p:ext uri="{BB962C8B-B14F-4D97-AF65-F5344CB8AC3E}">
-        <p14:creationId xmlns:p14="http://schemas.microsoft.com/office/powerpoint/2010/main" val="4277937291"/>
-      </p:ext>
-    </p:extLst>
-  </p:cSld>
-  <p:clrMapOvr>
-    <a:masterClrMapping/>
-  </p:clrMapOvr>
-</p:sld>
-</file>
-
 <file path=ppt/slides/slide13.xml><?xml version="1.0" encoding="utf-8"?>
 <p:sld xmlns:a="http://schemas.openxmlformats.org/drawingml/2006/main" xmlns:r="http://schemas.openxmlformats.org/officeDocument/2006/relationships" xmlns:p="http://schemas.openxmlformats.org/presentationml/2006/main">
   <p:cSld>
@@ -10280,7 +10385,7 @@
           <p:cNvPr id="2" name="Tytuł 1">
             <a:extLst>
               <a:ext uri="{FF2B5EF4-FFF2-40B4-BE49-F238E27FC236}">
-                <a16:creationId xmlns:a16="http://schemas.microsoft.com/office/drawing/2014/main" id="{CD5A2CB6-684A-96F2-7CCB-21AEE7E9AE68}"/>
+                <a16:creationId xmlns:a16="http://schemas.microsoft.com/office/drawing/2014/main" id="{9752CA37-AB61-08D7-A919-2225D161B169}"/>
               </a:ext>
             </a:extLst>
           </p:cNvPr>
@@ -10297,8 +10402,8 @@
           <a:lstStyle/>
           <a:p>
             <a:r>
-              <a:rPr lang="pl-PL" dirty="0"/>
-              <a:t>Zadanie 1</a:t>
+              <a:rPr lang="pl-PL" dirty="0" err="1"/>
+              <a:t>VirusTotal</a:t>
             </a:r>
             <a:endParaRPr lang="en-GB" dirty="0"/>
           </a:p>
@@ -10309,7 +10414,7 @@
           <p:cNvPr id="3" name="Symbol zastępczy zawartości 2">
             <a:extLst>
               <a:ext uri="{FF2B5EF4-FFF2-40B4-BE49-F238E27FC236}">
-                <a16:creationId xmlns:a16="http://schemas.microsoft.com/office/drawing/2014/main" id="{56F6C2A0-264B-8273-5FE6-EE44462473BC}"/>
+                <a16:creationId xmlns:a16="http://schemas.microsoft.com/office/drawing/2014/main" id="{53F177E5-3671-CAD7-E81D-4F61503D079F}"/>
               </a:ext>
             </a:extLst>
           </p:cNvPr>
@@ -10325,14 +10430,25 @@
           <a:bodyPr/>
           <a:lstStyle/>
           <a:p>
-            <a:endParaRPr lang="en-GB"/>
+            <a:pPr marL="0" indent="0">
+              <a:buNone/>
+            </a:pPr>
+            <a:r>
+              <a:rPr lang="pl-PL" dirty="0" err="1"/>
+              <a:t>VirusTotal</a:t>
+            </a:r>
+            <a:r>
+              <a:rPr lang="pl-PL" dirty="0"/>
+              <a:t> jest to strona służąca do analizy podejrzanych plików, domen, IP oraz URL do wykrywania złośliwego oprogramowania. Używamy API, aby sprawdzać przesyłane pliki czy nie zawierają one złośliwego oprogramowania.</a:t>
+            </a:r>
+            <a:endParaRPr lang="en-GB" dirty="0"/>
           </a:p>
         </p:txBody>
       </p:sp>
     </p:spTree>
     <p:extLst>
       <p:ext uri="{BB962C8B-B14F-4D97-AF65-F5344CB8AC3E}">
-        <p14:creationId xmlns:p14="http://schemas.microsoft.com/office/powerpoint/2010/main" val="4243993716"/>
+        <p14:creationId xmlns:p14="http://schemas.microsoft.com/office/powerpoint/2010/main" val="4277937291"/>
       </p:ext>
     </p:extLst>
   </p:cSld>
@@ -10364,7 +10480,7 @@
           <p:cNvPr id="2" name="Tytuł 1">
             <a:extLst>
               <a:ext uri="{FF2B5EF4-FFF2-40B4-BE49-F238E27FC236}">
-                <a16:creationId xmlns:a16="http://schemas.microsoft.com/office/drawing/2014/main" id="{AE28D52C-3EB7-8EFF-C452-DD2B11CCF410}"/>
+                <a16:creationId xmlns:a16="http://schemas.microsoft.com/office/drawing/2014/main" id="{CD5A2CB6-684A-96F2-7CCB-21AEE7E9AE68}"/>
               </a:ext>
             </a:extLst>
           </p:cNvPr>
@@ -10382,7 +10498,7 @@
           <a:p>
             <a:r>
               <a:rPr lang="pl-PL" dirty="0"/>
-              <a:t>Zadanie 2</a:t>
+              <a:t>Zadanie 1</a:t>
             </a:r>
             <a:endParaRPr lang="en-GB" dirty="0"/>
           </a:p>
@@ -10393,7 +10509,7 @@
           <p:cNvPr id="3" name="Symbol zastępczy zawartości 2">
             <a:extLst>
               <a:ext uri="{FF2B5EF4-FFF2-40B4-BE49-F238E27FC236}">
-                <a16:creationId xmlns:a16="http://schemas.microsoft.com/office/drawing/2014/main" id="{9AC1CF11-3DED-50F2-6BBF-45A2A3F1AA74}"/>
+                <a16:creationId xmlns:a16="http://schemas.microsoft.com/office/drawing/2014/main" id="{56F6C2A0-264B-8273-5FE6-EE44462473BC}"/>
               </a:ext>
             </a:extLst>
           </p:cNvPr>
@@ -10409,14 +10525,21 @@
           <a:bodyPr/>
           <a:lstStyle/>
           <a:p>
-            <a:endParaRPr lang="en-GB"/>
+            <a:pPr marL="0" indent="0">
+              <a:buNone/>
+            </a:pPr>
+            <a:r>
+              <a:rPr lang="pl-PL" dirty="0"/>
+              <a:t>Użytkownicy będą mieli za zadanie wysłać zainfekowany plik z użyciem maszyn wirtualnych i uzyskać dostęp do podatnej maszyny wirtualnej.</a:t>
+            </a:r>
+            <a:endParaRPr lang="en-GB" dirty="0"/>
           </a:p>
         </p:txBody>
       </p:sp>
     </p:spTree>
     <p:extLst>
       <p:ext uri="{BB962C8B-B14F-4D97-AF65-F5344CB8AC3E}">
-        <p14:creationId xmlns:p14="http://schemas.microsoft.com/office/powerpoint/2010/main" val="3435662834"/>
+        <p14:creationId xmlns:p14="http://schemas.microsoft.com/office/powerpoint/2010/main" val="4243993716"/>
       </p:ext>
     </p:extLst>
   </p:cSld>
@@ -10448,7 +10571,7 @@
           <p:cNvPr id="2" name="Tytuł 1">
             <a:extLst>
               <a:ext uri="{FF2B5EF4-FFF2-40B4-BE49-F238E27FC236}">
-                <a16:creationId xmlns:a16="http://schemas.microsoft.com/office/drawing/2014/main" id="{EB693AD7-E102-E148-02CC-50B5E06F3A24}"/>
+                <a16:creationId xmlns:a16="http://schemas.microsoft.com/office/drawing/2014/main" id="{AE28D52C-3EB7-8EFF-C452-DD2B11CCF410}"/>
               </a:ext>
             </a:extLst>
           </p:cNvPr>
@@ -10466,7 +10589,7 @@
           <a:p>
             <a:r>
               <a:rPr lang="pl-PL" dirty="0"/>
-              <a:t>Zadanie 3</a:t>
+              <a:t>Zadanie 2</a:t>
             </a:r>
             <a:endParaRPr lang="en-GB" dirty="0"/>
           </a:p>
@@ -10477,7 +10600,7 @@
           <p:cNvPr id="3" name="Symbol zastępczy zawartości 2">
             <a:extLst>
               <a:ext uri="{FF2B5EF4-FFF2-40B4-BE49-F238E27FC236}">
-                <a16:creationId xmlns:a16="http://schemas.microsoft.com/office/drawing/2014/main" id="{95C9A3E3-8879-1E5A-FB7B-7C2FBA7638FA}"/>
+                <a16:creationId xmlns:a16="http://schemas.microsoft.com/office/drawing/2014/main" id="{9AC1CF11-3DED-50F2-6BBF-45A2A3F1AA74}"/>
               </a:ext>
             </a:extLst>
           </p:cNvPr>
@@ -10493,7 +10616,129 @@
           <a:bodyPr/>
           <a:lstStyle/>
           <a:p>
-            <a:endParaRPr lang="en-GB"/>
+            <a:pPr marL="0" indent="0">
+              <a:buNone/>
+            </a:pPr>
+            <a:r>
+              <a:rPr lang="pl-PL" dirty="0"/>
+              <a:t>Wykonanie poleceń na Windowsie z użyciem Kali Linux. Dotyczą one wielu różnych komend które można wykonać z użyciem </a:t>
+            </a:r>
+            <a:r>
+              <a:rPr lang="pl-PL" dirty="0" err="1"/>
+              <a:t>Command</a:t>
+            </a:r>
+            <a:r>
+              <a:rPr lang="pl-PL" dirty="0"/>
+              <a:t> </a:t>
+            </a:r>
+            <a:r>
+              <a:rPr lang="pl-PL" dirty="0" err="1"/>
+              <a:t>Prompt</a:t>
+            </a:r>
+            <a:r>
+              <a:rPr lang="pl-PL" dirty="0"/>
+              <a:t> na Windowsie.  </a:t>
+            </a:r>
+            <a:endParaRPr lang="en-GB" dirty="0"/>
+          </a:p>
+        </p:txBody>
+      </p:sp>
+    </p:spTree>
+    <p:extLst>
+      <p:ext uri="{BB962C8B-B14F-4D97-AF65-F5344CB8AC3E}">
+        <p14:creationId xmlns:p14="http://schemas.microsoft.com/office/powerpoint/2010/main" val="3435662834"/>
+      </p:ext>
+    </p:extLst>
+  </p:cSld>
+  <p:clrMapOvr>
+    <a:masterClrMapping/>
+  </p:clrMapOvr>
+</p:sld>
+</file>
+
+<file path=ppt/slides/slide16.xml><?xml version="1.0" encoding="utf-8"?>
+<p:sld xmlns:a="http://schemas.openxmlformats.org/drawingml/2006/main" xmlns:r="http://schemas.openxmlformats.org/officeDocument/2006/relationships" xmlns:p="http://schemas.openxmlformats.org/presentationml/2006/main">
+  <p:cSld>
+    <p:spTree>
+      <p:nvGrpSpPr>
+        <p:cNvPr id="1" name=""/>
+        <p:cNvGrpSpPr/>
+        <p:nvPr/>
+      </p:nvGrpSpPr>
+      <p:grpSpPr>
+        <a:xfrm>
+          <a:off x="0" y="0"/>
+          <a:ext cx="0" cy="0"/>
+          <a:chOff x="0" y="0"/>
+          <a:chExt cx="0" cy="0"/>
+        </a:xfrm>
+      </p:grpSpPr>
+      <p:sp>
+        <p:nvSpPr>
+          <p:cNvPr id="2" name="Tytuł 1">
+            <a:extLst>
+              <a:ext uri="{FF2B5EF4-FFF2-40B4-BE49-F238E27FC236}">
+                <a16:creationId xmlns:a16="http://schemas.microsoft.com/office/drawing/2014/main" id="{EB693AD7-E102-E148-02CC-50B5E06F3A24}"/>
+              </a:ext>
+            </a:extLst>
+          </p:cNvPr>
+          <p:cNvSpPr>
+            <a:spLocks noGrp="1"/>
+          </p:cNvSpPr>
+          <p:nvPr>
+            <p:ph type="title"/>
+          </p:nvPr>
+        </p:nvSpPr>
+        <p:spPr/>
+        <p:txBody>
+          <a:bodyPr/>
+          <a:lstStyle/>
+          <a:p>
+            <a:r>
+              <a:rPr lang="pl-PL" dirty="0"/>
+              <a:t>Zadanie 3</a:t>
+            </a:r>
+            <a:endParaRPr lang="en-GB" dirty="0"/>
+          </a:p>
+        </p:txBody>
+      </p:sp>
+      <p:sp>
+        <p:nvSpPr>
+          <p:cNvPr id="3" name="Symbol zastępczy zawartości 2">
+            <a:extLst>
+              <a:ext uri="{FF2B5EF4-FFF2-40B4-BE49-F238E27FC236}">
+                <a16:creationId xmlns:a16="http://schemas.microsoft.com/office/drawing/2014/main" id="{95C9A3E3-8879-1E5A-FB7B-7C2FBA7638FA}"/>
+              </a:ext>
+            </a:extLst>
+          </p:cNvPr>
+          <p:cNvSpPr>
+            <a:spLocks noGrp="1"/>
+          </p:cNvSpPr>
+          <p:nvPr>
+            <p:ph idx="1"/>
+          </p:nvPr>
+        </p:nvSpPr>
+        <p:spPr/>
+        <p:txBody>
+          <a:bodyPr/>
+          <a:lstStyle/>
+          <a:p>
+            <a:pPr marL="0" indent="0">
+              <a:buNone/>
+            </a:pPr>
+            <a:r>
+              <a:rPr lang="pl-PL" dirty="0"/>
+              <a:t>Zadanie ma na celu wykorzystanie API </a:t>
+            </a:r>
+            <a:r>
+              <a:rPr lang="pl-PL" dirty="0" err="1"/>
+              <a:t>VirusTotal</a:t>
+            </a:r>
+            <a:r>
+              <a:rPr lang="pl-PL" dirty="0"/>
+              <a:t> do sprawdzania zainfekowanych plików i sprawdzanie działania tego API.</a:t>
+            </a:r>
+            <a:endParaRPr lang="en-GB" dirty="0"/>
           </a:p>
         </p:txBody>
       </p:sp>
@@ -10510,7 +10755,7 @@
 </p:sld>
 </file>
 
-<file path=ppt/slides/slide16.xml><?xml version="1.0" encoding="utf-8"?>
+<file path=ppt/slides/slide17.xml><?xml version="1.0" encoding="utf-8"?>
 <p:sld xmlns:a="http://schemas.openxmlformats.org/drawingml/2006/main" xmlns:r="http://schemas.openxmlformats.org/officeDocument/2006/relationships" xmlns:p="http://schemas.openxmlformats.org/presentationml/2006/main">
   <p:cSld>
     <p:bg>

</xml_diff>